<commit_message>
Update with Coding You tube for revision
Update with Coding You tube for revision
</commit_message>
<xml_diff>
--- a/Links-For Revision.pptx
+++ b/Links-For Revision.pptx
@@ -104,6 +104,11 @@
       </a:defRPr>
     </a:lvl9pPr>
   </p:defaultTextStyle>
+  <p:extLst>
+    <p:ext uri="{EFAFB233-063F-42B5-8137-9DF3F51BA10A}">
+      <p15:sldGuideLst xmlns:p15="http://schemas.microsoft.com/office/powerpoint/2012/main"/>
+    </p:ext>
+  </p:extLst>
 </p:presentation>
 </file>
 
@@ -3357,7 +3362,7 @@
         <p:spPr>
           <a:xfrm>
             <a:off x="228600" y="512064"/>
-            <a:ext cx="11676888" cy="923330"/>
+            <a:ext cx="11676888" cy="5632311"/>
           </a:xfrm>
           <a:prstGeom prst="rect">
             <a:avLst/>
@@ -3372,6 +3377,15 @@
           <a:p>
             <a:r>
               <a:rPr lang="en-IN" dirty="0"/>
+              <a:t>System Design, Backend Stack , Frontend Stack</a:t>
+            </a:r>
+          </a:p>
+          <a:p>
+            <a:endParaRPr lang="en-IN" dirty="0"/>
+          </a:p>
+          <a:p>
+            <a:r>
+              <a:rPr lang="en-IN" dirty="0"/>
               <a:t>For Revision of REST API, follow the below link:</a:t>
             </a:r>
           </a:p>
@@ -3380,15 +3394,69 @@
               <a:rPr lang="en-IN" dirty="0">
                 <a:hlinkClick r:id="rId2"/>
               </a:rPr>
-              <a:t>https://www.youtube.com/watch?v=ST8XxjOTIsg&amp;list</a:t>
-            </a:r>
+              <a:t>https://www.youtube.com/watch?v=ST8XxjOTIsg&amp;list=PLTCrU9sGybupzS5-3iYTsYUI1emBDKdHu</a:t>
+            </a:r>
+            <a:endParaRPr lang="en-IN" dirty="0"/>
+          </a:p>
+          <a:p>
+            <a:endParaRPr lang="en-IN" dirty="0"/>
+          </a:p>
+          <a:p>
+            <a:endParaRPr lang="en-IN" dirty="0"/>
+          </a:p>
+          <a:p>
+            <a:r>
+              <a:rPr lang="en-IN" dirty="0">
+                <a:hlinkClick r:id="rId3"/>
+              </a:rPr>
+              <a:t>https://www.youtube.com/@sudocode/playlists</a:t>
+            </a:r>
+            <a:endParaRPr lang="en-IN" dirty="0"/>
+          </a:p>
+          <a:p>
+            <a:endParaRPr lang="en-IN" dirty="0"/>
+          </a:p>
+          <a:p>
+            <a:endParaRPr lang="en-IN" dirty="0"/>
+          </a:p>
+          <a:p>
+            <a:endParaRPr lang="en-IN" dirty="0"/>
+          </a:p>
+          <a:p>
+            <a:endParaRPr lang="en-IN" dirty="0"/>
+          </a:p>
+          <a:p>
+            <a:endParaRPr lang="en-IN" dirty="0"/>
+          </a:p>
+          <a:p>
+            <a:endParaRPr lang="en-IN" dirty="0"/>
+          </a:p>
+          <a:p>
+            <a:endParaRPr lang="en-IN" dirty="0"/>
+          </a:p>
+          <a:p>
+            <a:r>
+              <a:rPr lang="en-IN" dirty="0"/>
+              <a:t>Coding </a:t>
+            </a:r>
+          </a:p>
+          <a:p>
             <a:r>
               <a:rPr lang="en-IN">
-                <a:hlinkClick r:id="rId2"/>
+                <a:hlinkClick r:id="rId4"/>
               </a:rPr>
-              <a:t>=PLTCrU9sGybupzS5-3iYTsYUI1emBDKdHu</a:t>
-            </a:r>
-            <a:endParaRPr lang="en-IN"/>
+              <a:t>https://www.youtube.com/@LeadCodingbyFRAZ</a:t>
+            </a:r>
+            <a:endParaRPr lang="en-IN"/>
+          </a:p>
+          <a:p>
+            <a:endParaRPr lang="en-IN" dirty="0"/>
+          </a:p>
+          <a:p>
+            <a:endParaRPr lang="en-IN" dirty="0"/>
+          </a:p>
+          <a:p>
+            <a:endParaRPr lang="en-IN" dirty="0"/>
           </a:p>
           <a:p>
             <a:endParaRPr lang="en-IN" dirty="0"/>

</xml_diff>